<commit_message>
Modified the description about log level in '5.7.2.3.4. Basic flow when the servlet container handles the exception at web application level'. #231
</commit_message>
<xml_diff>
--- a/source/ArchitectureInDetail/images_ExceptionHandling/materialExceptionHandling.pptx
+++ b/source/ArchitectureInDetail/images_ExceptionHandling/materialExceptionHandling.pptx
@@ -240,7 +240,7 @@
             <a:fld id="{3BB47352-BF5A-4CD2-B029-996118CD8E01}" type="datetimeFigureOut">
               <a:rPr kumimoji="1" lang="ja-JP" altLang="en-US" smtClean="0"/>
               <a:pPr/>
-              <a:t>2014/3/19</a:t>
+              <a:t>2014/6/27</a:t>
             </a:fld>
             <a:endParaRPr kumimoji="1" lang="ja-JP" altLang="en-US" dirty="0"/>
           </a:p>
@@ -1488,7 +1488,7 @@
             <a:fld id="{7B9B12EC-6AA0-374B-A2D3-850081A07A26}" type="datetimeFigureOut">
               <a:rPr kumimoji="1" lang="ja-JP" altLang="en-US" smtClean="0"/>
               <a:pPr/>
-              <a:t>2014/3/19</a:t>
+              <a:t>2014/6/27</a:t>
             </a:fld>
             <a:endParaRPr kumimoji="1" lang="ja-JP" altLang="en-US" dirty="0"/>
           </a:p>
@@ -1692,7 +1692,7 @@
             <a:fld id="{7B9B12EC-6AA0-374B-A2D3-850081A07A26}" type="datetimeFigureOut">
               <a:rPr kumimoji="1" lang="ja-JP" altLang="en-US" smtClean="0"/>
               <a:pPr/>
-              <a:t>2014/3/19</a:t>
+              <a:t>2014/6/27</a:t>
             </a:fld>
             <a:endParaRPr kumimoji="1" lang="ja-JP" altLang="en-US" dirty="0"/>
           </a:p>
@@ -1906,7 +1906,7 @@
             <a:fld id="{7B9B12EC-6AA0-374B-A2D3-850081A07A26}" type="datetimeFigureOut">
               <a:rPr kumimoji="1" lang="ja-JP" altLang="en-US" smtClean="0"/>
               <a:pPr/>
-              <a:t>2014/3/19</a:t>
+              <a:t>2014/6/27</a:t>
             </a:fld>
             <a:endParaRPr kumimoji="1" lang="ja-JP" altLang="en-US" dirty="0"/>
           </a:p>
@@ -2110,7 +2110,7 @@
             <a:fld id="{7B9B12EC-6AA0-374B-A2D3-850081A07A26}" type="datetimeFigureOut">
               <a:rPr kumimoji="1" lang="ja-JP" altLang="en-US" smtClean="0"/>
               <a:pPr/>
-              <a:t>2014/3/19</a:t>
+              <a:t>2014/6/27</a:t>
             </a:fld>
             <a:endParaRPr kumimoji="1" lang="ja-JP" altLang="en-US" dirty="0"/>
           </a:p>
@@ -2358,7 +2358,7 @@
             <a:fld id="{7B9B12EC-6AA0-374B-A2D3-850081A07A26}" type="datetimeFigureOut">
               <a:rPr kumimoji="1" lang="ja-JP" altLang="en-US" smtClean="0"/>
               <a:pPr/>
-              <a:t>2014/3/19</a:t>
+              <a:t>2014/6/27</a:t>
             </a:fld>
             <a:endParaRPr kumimoji="1" lang="ja-JP" altLang="en-US" dirty="0"/>
           </a:p>
@@ -2712,7 +2712,7 @@
             <a:fld id="{7B9B12EC-6AA0-374B-A2D3-850081A07A26}" type="datetimeFigureOut">
               <a:rPr kumimoji="1" lang="ja-JP" altLang="en-US" smtClean="0"/>
               <a:pPr/>
-              <a:t>2014/3/19</a:t>
+              <a:t>2014/6/27</a:t>
             </a:fld>
             <a:endParaRPr kumimoji="1" lang="ja-JP" altLang="en-US" dirty="0"/>
           </a:p>
@@ -3200,7 +3200,7 @@
             <a:fld id="{7B9B12EC-6AA0-374B-A2D3-850081A07A26}" type="datetimeFigureOut">
               <a:rPr kumimoji="1" lang="ja-JP" altLang="en-US" smtClean="0"/>
               <a:pPr/>
-              <a:t>2014/3/19</a:t>
+              <a:t>2014/6/27</a:t>
             </a:fld>
             <a:endParaRPr kumimoji="1" lang="ja-JP" altLang="en-US" dirty="0"/>
           </a:p>
@@ -3320,7 +3320,7 @@
             <a:fld id="{7B9B12EC-6AA0-374B-A2D3-850081A07A26}" type="datetimeFigureOut">
               <a:rPr kumimoji="1" lang="ja-JP" altLang="en-US" smtClean="0"/>
               <a:pPr/>
-              <a:t>2014/3/19</a:t>
+              <a:t>2014/6/27</a:t>
             </a:fld>
             <a:endParaRPr kumimoji="1" lang="ja-JP" altLang="en-US" dirty="0"/>
           </a:p>
@@ -3417,7 +3417,7 @@
             <a:fld id="{7B9B12EC-6AA0-374B-A2D3-850081A07A26}" type="datetimeFigureOut">
               <a:rPr kumimoji="1" lang="ja-JP" altLang="en-US" smtClean="0"/>
               <a:pPr/>
-              <a:t>2014/3/19</a:t>
+              <a:t>2014/6/27</a:t>
             </a:fld>
             <a:endParaRPr kumimoji="1" lang="ja-JP" altLang="en-US" dirty="0"/>
           </a:p>
@@ -3728,7 +3728,7 @@
             <a:fld id="{7B9B12EC-6AA0-374B-A2D3-850081A07A26}" type="datetimeFigureOut">
               <a:rPr kumimoji="1" lang="ja-JP" altLang="en-US" smtClean="0"/>
               <a:pPr/>
-              <a:t>2014/3/19</a:t>
+              <a:t>2014/6/27</a:t>
             </a:fld>
             <a:endParaRPr kumimoji="1" lang="ja-JP" altLang="en-US" dirty="0"/>
           </a:p>
@@ -3983,7 +3983,7 @@
             <a:fld id="{7B9B12EC-6AA0-374B-A2D3-850081A07A26}" type="datetimeFigureOut">
               <a:rPr kumimoji="1" lang="ja-JP" altLang="en-US" smtClean="0"/>
               <a:pPr/>
-              <a:t>2014/3/19</a:t>
+              <a:t>2014/6/27</a:t>
             </a:fld>
             <a:endParaRPr kumimoji="1" lang="ja-JP" altLang="en-US" dirty="0"/>
           </a:p>
@@ -4230,7 +4230,7 @@
             <a:fld id="{7B9B12EC-6AA0-374B-A2D3-850081A07A26}" type="datetimeFigureOut">
               <a:rPr kumimoji="1" lang="ja-JP" altLang="en-US" smtClean="0"/>
               <a:pPr/>
-              <a:t>2014/3/19</a:t>
+              <a:t>2014/6/27</a:t>
             </a:fld>
             <a:endParaRPr kumimoji="1" lang="ja-JP" altLang="en-US" dirty="0"/>
           </a:p>
@@ -13565,59 +13565,6 @@
       </p:sp>
       <p:sp>
         <p:nvSpPr>
-          <p:cNvPr id="64" name="右矢印 63"/>
-          <p:cNvSpPr/>
-          <p:nvPr/>
-        </p:nvSpPr>
-        <p:spPr>
-          <a:xfrm>
-            <a:off x="4256452" y="322405"/>
-            <a:ext cx="565650" cy="344590"/>
-          </a:xfrm>
-          <a:prstGeom prst="rightArrow">
-            <a:avLst/>
-          </a:prstGeom>
-          <a:solidFill>
-            <a:schemeClr val="bg1"/>
-          </a:solidFill>
-        </p:spPr>
-        <p:style>
-          <a:lnRef idx="1">
-            <a:schemeClr val="accent1"/>
-          </a:lnRef>
-          <a:fillRef idx="3">
-            <a:schemeClr val="accent1"/>
-          </a:fillRef>
-          <a:effectRef idx="2">
-            <a:schemeClr val="accent1"/>
-          </a:effectRef>
-          <a:fontRef idx="minor">
-            <a:schemeClr val="lt1"/>
-          </a:fontRef>
-        </p:style>
-        <p:txBody>
-          <a:bodyPr rtlCol="0" anchor="ctr"/>
-          <a:lstStyle/>
-          <a:p>
-            <a:pPr algn="ctr"/>
-            <a:r>
-              <a:rPr kumimoji="1" lang="en-US" altLang="ja-JP" sz="1000" dirty="0" smtClean="0">
-                <a:solidFill>
-                  <a:schemeClr val="tx1"/>
-                </a:solidFill>
-              </a:rPr>
-              <a:t>error</a:t>
-            </a:r>
-            <a:endParaRPr kumimoji="1" lang="ja-JP" altLang="en-US" sz="1000" dirty="0">
-              <a:solidFill>
-                <a:schemeClr val="tx1"/>
-              </a:solidFill>
-            </a:endParaRPr>
-          </a:p>
-        </p:txBody>
-      </p:sp>
-      <p:sp>
-        <p:nvSpPr>
           <p:cNvPr id="66" name="正方形/長方形 65"/>
           <p:cNvSpPr/>
           <p:nvPr/>
@@ -14381,6 +14328,160 @@
           </p:txBody>
         </p:sp>
       </p:grpSp>
+      <p:sp>
+        <p:nvSpPr>
+          <p:cNvPr id="76" name="右矢印 75"/>
+          <p:cNvSpPr/>
+          <p:nvPr/>
+        </p:nvSpPr>
+        <p:spPr>
+          <a:xfrm>
+            <a:off x="4230006" y="494702"/>
+            <a:ext cx="592096" cy="344590"/>
+          </a:xfrm>
+          <a:prstGeom prst="rightArrow">
+            <a:avLst/>
+          </a:prstGeom>
+          <a:solidFill>
+            <a:schemeClr val="bg1"/>
+          </a:solidFill>
+        </p:spPr>
+        <p:style>
+          <a:lnRef idx="1">
+            <a:schemeClr val="accent1"/>
+          </a:lnRef>
+          <a:fillRef idx="3">
+            <a:schemeClr val="accent1"/>
+          </a:fillRef>
+          <a:effectRef idx="2">
+            <a:schemeClr val="accent1"/>
+          </a:effectRef>
+          <a:fontRef idx="minor">
+            <a:schemeClr val="lt1"/>
+          </a:fontRef>
+        </p:style>
+        <p:txBody>
+          <a:bodyPr rtlCol="0" anchor="ctr"/>
+          <a:lstStyle/>
+          <a:p>
+            <a:pPr algn="ctr"/>
+            <a:r>
+              <a:rPr lang="en-US" altLang="ja-JP" sz="1000" dirty="0" smtClean="0">
+                <a:solidFill>
+                  <a:schemeClr val="tx1"/>
+                </a:solidFill>
+              </a:rPr>
+              <a:t>error</a:t>
+            </a:r>
+            <a:endParaRPr kumimoji="1" lang="en-US" altLang="ja-JP" sz="1000" dirty="0" smtClean="0">
+              <a:solidFill>
+                <a:schemeClr val="tx1"/>
+              </a:solidFill>
+            </a:endParaRPr>
+          </a:p>
+        </p:txBody>
+      </p:sp>
+      <p:sp>
+        <p:nvSpPr>
+          <p:cNvPr id="80" name="右矢印 79"/>
+          <p:cNvSpPr/>
+          <p:nvPr/>
+        </p:nvSpPr>
+        <p:spPr>
+          <a:xfrm>
+            <a:off x="4230006" y="332063"/>
+            <a:ext cx="592096" cy="344590"/>
+          </a:xfrm>
+          <a:prstGeom prst="rightArrow">
+            <a:avLst/>
+          </a:prstGeom>
+          <a:solidFill>
+            <a:schemeClr val="bg1"/>
+          </a:solidFill>
+        </p:spPr>
+        <p:style>
+          <a:lnRef idx="1">
+            <a:schemeClr val="accent1"/>
+          </a:lnRef>
+          <a:fillRef idx="3">
+            <a:schemeClr val="accent1"/>
+          </a:fillRef>
+          <a:effectRef idx="2">
+            <a:schemeClr val="accent1"/>
+          </a:effectRef>
+          <a:fontRef idx="minor">
+            <a:schemeClr val="lt1"/>
+          </a:fontRef>
+        </p:style>
+        <p:txBody>
+          <a:bodyPr rtlCol="0" anchor="ctr"/>
+          <a:lstStyle/>
+          <a:p>
+            <a:pPr algn="ctr"/>
+            <a:r>
+              <a:rPr kumimoji="1" lang="en-US" altLang="ja-JP" sz="1000" dirty="0" smtClean="0">
+                <a:solidFill>
+                  <a:schemeClr val="tx1"/>
+                </a:solidFill>
+              </a:rPr>
+              <a:t>warn</a:t>
+            </a:r>
+          </a:p>
+        </p:txBody>
+      </p:sp>
+      <p:sp>
+        <p:nvSpPr>
+          <p:cNvPr id="81" name="右矢印 80"/>
+          <p:cNvSpPr/>
+          <p:nvPr/>
+        </p:nvSpPr>
+        <p:spPr>
+          <a:xfrm>
+            <a:off x="4230006" y="150112"/>
+            <a:ext cx="592096" cy="344590"/>
+          </a:xfrm>
+          <a:prstGeom prst="rightArrow">
+            <a:avLst/>
+          </a:prstGeom>
+          <a:solidFill>
+            <a:schemeClr val="bg1"/>
+          </a:solidFill>
+        </p:spPr>
+        <p:style>
+          <a:lnRef idx="1">
+            <a:schemeClr val="accent1"/>
+          </a:lnRef>
+          <a:fillRef idx="3">
+            <a:schemeClr val="accent1"/>
+          </a:fillRef>
+          <a:effectRef idx="2">
+            <a:schemeClr val="accent1"/>
+          </a:effectRef>
+          <a:fontRef idx="minor">
+            <a:schemeClr val="lt1"/>
+          </a:fontRef>
+        </p:style>
+        <p:txBody>
+          <a:bodyPr rtlCol="0" anchor="ctr"/>
+          <a:lstStyle/>
+          <a:p>
+            <a:pPr algn="ctr"/>
+            <a:r>
+              <a:rPr kumimoji="1" lang="en-US" altLang="ja-JP" sz="1000" dirty="0" smtClean="0">
+                <a:solidFill>
+                  <a:schemeClr val="tx1"/>
+                </a:solidFill>
+              </a:rPr>
+              <a:t>Info</a:t>
+            </a:r>
+            <a:endParaRPr lang="en-US" altLang="ja-JP" sz="1000" dirty="0">
+              <a:solidFill>
+                <a:schemeClr val="tx1"/>
+              </a:solidFill>
+            </a:endParaRPr>
+          </a:p>
+        </p:txBody>
+      </p:sp>
     </p:spTree>
     <p:extLst>
       <p:ext uri="{BB962C8B-B14F-4D97-AF65-F5344CB8AC3E}">

</xml_diff>